<commit_message>
Adding all changes through week 8
</commit_message>
<xml_diff>
--- a/2022-SPR/Week05.pptx
+++ b/2022-SPR/Week05.pptx
@@ -270,7 +270,7 @@
           <a:p>
             <a:fld id="{2B1919C7-6BC3-4736-AC32-A62C7B81C82C}" type="datetimeFigureOut">
               <a:rPr lang="en-US" smtClean="0"/>
-              <a:t>2/5/2022</a:t>
+              <a:t>2/9/2022</a:t>
             </a:fld>
             <a:endParaRPr lang="en-US"/>
           </a:p>
@@ -468,7 +468,7 @@
           <a:p>
             <a:fld id="{2B1919C7-6BC3-4736-AC32-A62C7B81C82C}" type="datetimeFigureOut">
               <a:rPr lang="en-US" smtClean="0"/>
-              <a:t>2/5/2022</a:t>
+              <a:t>2/9/2022</a:t>
             </a:fld>
             <a:endParaRPr lang="en-US"/>
           </a:p>
@@ -676,7 +676,7 @@
           <a:p>
             <a:fld id="{2B1919C7-6BC3-4736-AC32-A62C7B81C82C}" type="datetimeFigureOut">
               <a:rPr lang="en-US" smtClean="0"/>
-              <a:t>2/5/2022</a:t>
+              <a:t>2/9/2022</a:t>
             </a:fld>
             <a:endParaRPr lang="en-US"/>
           </a:p>
@@ -874,7 +874,7 @@
           <a:p>
             <a:fld id="{2B1919C7-6BC3-4736-AC32-A62C7B81C82C}" type="datetimeFigureOut">
               <a:rPr lang="en-US" smtClean="0"/>
-              <a:t>2/5/2022</a:t>
+              <a:t>2/9/2022</a:t>
             </a:fld>
             <a:endParaRPr lang="en-US"/>
           </a:p>
@@ -1149,7 +1149,7 @@
           <a:p>
             <a:fld id="{2B1919C7-6BC3-4736-AC32-A62C7B81C82C}" type="datetimeFigureOut">
               <a:rPr lang="en-US" smtClean="0"/>
-              <a:t>2/5/2022</a:t>
+              <a:t>2/9/2022</a:t>
             </a:fld>
             <a:endParaRPr lang="en-US"/>
           </a:p>
@@ -1414,7 +1414,7 @@
           <a:p>
             <a:fld id="{2B1919C7-6BC3-4736-AC32-A62C7B81C82C}" type="datetimeFigureOut">
               <a:rPr lang="en-US" smtClean="0"/>
-              <a:t>2/5/2022</a:t>
+              <a:t>2/9/2022</a:t>
             </a:fld>
             <a:endParaRPr lang="en-US"/>
           </a:p>
@@ -1826,7 +1826,7 @@
           <a:p>
             <a:fld id="{2B1919C7-6BC3-4736-AC32-A62C7B81C82C}" type="datetimeFigureOut">
               <a:rPr lang="en-US" smtClean="0"/>
-              <a:t>2/5/2022</a:t>
+              <a:t>2/9/2022</a:t>
             </a:fld>
             <a:endParaRPr lang="en-US"/>
           </a:p>
@@ -1967,7 +1967,7 @@
           <a:p>
             <a:fld id="{2B1919C7-6BC3-4736-AC32-A62C7B81C82C}" type="datetimeFigureOut">
               <a:rPr lang="en-US" smtClean="0"/>
-              <a:t>2/5/2022</a:t>
+              <a:t>2/9/2022</a:t>
             </a:fld>
             <a:endParaRPr lang="en-US"/>
           </a:p>
@@ -2080,7 +2080,7 @@
           <a:p>
             <a:fld id="{2B1919C7-6BC3-4736-AC32-A62C7B81C82C}" type="datetimeFigureOut">
               <a:rPr lang="en-US" smtClean="0"/>
-              <a:t>2/5/2022</a:t>
+              <a:t>2/9/2022</a:t>
             </a:fld>
             <a:endParaRPr lang="en-US"/>
           </a:p>
@@ -2391,7 +2391,7 @@
           <a:p>
             <a:fld id="{2B1919C7-6BC3-4736-AC32-A62C7B81C82C}" type="datetimeFigureOut">
               <a:rPr lang="en-US" smtClean="0"/>
-              <a:t>2/5/2022</a:t>
+              <a:t>2/9/2022</a:t>
             </a:fld>
             <a:endParaRPr lang="en-US"/>
           </a:p>
@@ -2679,7 +2679,7 @@
           <a:p>
             <a:fld id="{2B1919C7-6BC3-4736-AC32-A62C7B81C82C}" type="datetimeFigureOut">
               <a:rPr lang="en-US" smtClean="0"/>
-              <a:t>2/5/2022</a:t>
+              <a:t>2/9/2022</a:t>
             </a:fld>
             <a:endParaRPr lang="en-US"/>
           </a:p>
@@ -2920,7 +2920,7 @@
           <a:p>
             <a:fld id="{2B1919C7-6BC3-4736-AC32-A62C7B81C82C}" type="datetimeFigureOut">
               <a:rPr lang="en-US" smtClean="0"/>
-              <a:t>2/5/2022</a:t>
+              <a:t>2/9/2022</a:t>
             </a:fld>
             <a:endParaRPr lang="en-US"/>
           </a:p>
@@ -3704,16 +3704,10 @@
               <a:buChar char="•"/>
             </a:pPr>
             <a:r>
-              <a:rPr lang="en-US" dirty="0" err="1">
-                <a:hlinkClick r:id="rId2" tooltip="Navigation menus in ASP.NET"/>
-              </a:rPr>
-              <a:t>Navigtion</a:t>
-            </a:r>
-            <a:r>
               <a:rPr lang="en-US" dirty="0">
                 <a:hlinkClick r:id="rId2" tooltip="Navigation menus in ASP.NET"/>
               </a:rPr>
-              <a:t> Menus in ASP.NET</a:t>
+              <a:t>Navigation Menus in ASP.NET</a:t>
             </a:r>
             <a:endParaRPr lang="en-US" dirty="0"/>
           </a:p>
@@ -4935,7 +4929,15 @@
             <a:pPr lvl="2"/>
             <a:r>
               <a:rPr lang="en-US" dirty="0"/>
-              <a:t>https://docs.mircosoft.com</a:t>
+              <a:t>https://docs</a:t>
+            </a:r>
+            <a:r>
+              <a:rPr lang="en-US"/>
+              <a:t>.microsoft</a:t>
+            </a:r>
+            <a:r>
+              <a:rPr lang="en-US" dirty="0"/>
+              <a:t>.com</a:t>
             </a:r>
           </a:p>
           <a:p>

</xml_diff>